<commit_message>
Improved SigMF infographic (#718)
</commit_message>
<xml_diff>
--- a/client/public/sigmf-diagram.pptx
+++ b/client/public/sigmf-diagram.pptx
@@ -3569,7 +3569,7 @@
           <a:p>
             <a:fld id="{473554FD-CB64-474C-AA34-D39D6235D9DC}" type="datetimeFigureOut">
               <a:rPr lang="en-US" smtClean="0"/>
-              <a:t>5/8/2023</a:t>
+              <a:t>10/18/2023</a:t>
             </a:fld>
             <a:endParaRPr lang="en-US"/>
           </a:p>
@@ -3739,7 +3739,7 @@
           <a:p>
             <a:fld id="{473554FD-CB64-474C-AA34-D39D6235D9DC}" type="datetimeFigureOut">
               <a:rPr lang="en-US" smtClean="0"/>
-              <a:t>5/8/2023</a:t>
+              <a:t>10/18/2023</a:t>
             </a:fld>
             <a:endParaRPr lang="en-US"/>
           </a:p>
@@ -3919,7 +3919,7 @@
           <a:p>
             <a:fld id="{473554FD-CB64-474C-AA34-D39D6235D9DC}" type="datetimeFigureOut">
               <a:rPr lang="en-US" smtClean="0"/>
-              <a:t>5/8/2023</a:t>
+              <a:t>10/18/2023</a:t>
             </a:fld>
             <a:endParaRPr lang="en-US"/>
           </a:p>
@@ -4089,7 +4089,7 @@
           <a:p>
             <a:fld id="{473554FD-CB64-474C-AA34-D39D6235D9DC}" type="datetimeFigureOut">
               <a:rPr lang="en-US" smtClean="0"/>
-              <a:t>5/8/2023</a:t>
+              <a:t>10/18/2023</a:t>
             </a:fld>
             <a:endParaRPr lang="en-US"/>
           </a:p>
@@ -4333,7 +4333,7 @@
           <a:p>
             <a:fld id="{473554FD-CB64-474C-AA34-D39D6235D9DC}" type="datetimeFigureOut">
               <a:rPr lang="en-US" smtClean="0"/>
-              <a:t>5/8/2023</a:t>
+              <a:t>10/18/2023</a:t>
             </a:fld>
             <a:endParaRPr lang="en-US"/>
           </a:p>
@@ -4565,7 +4565,7 @@
           <a:p>
             <a:fld id="{473554FD-CB64-474C-AA34-D39D6235D9DC}" type="datetimeFigureOut">
               <a:rPr lang="en-US" smtClean="0"/>
-              <a:t>5/8/2023</a:t>
+              <a:t>10/18/2023</a:t>
             </a:fld>
             <a:endParaRPr lang="en-US"/>
           </a:p>
@@ -4932,7 +4932,7 @@
           <a:p>
             <a:fld id="{473554FD-CB64-474C-AA34-D39D6235D9DC}" type="datetimeFigureOut">
               <a:rPr lang="en-US" smtClean="0"/>
-              <a:t>5/8/2023</a:t>
+              <a:t>10/18/2023</a:t>
             </a:fld>
             <a:endParaRPr lang="en-US"/>
           </a:p>
@@ -5050,7 +5050,7 @@
           <a:p>
             <a:fld id="{473554FD-CB64-474C-AA34-D39D6235D9DC}" type="datetimeFigureOut">
               <a:rPr lang="en-US" smtClean="0"/>
-              <a:t>5/8/2023</a:t>
+              <a:t>10/18/2023</a:t>
             </a:fld>
             <a:endParaRPr lang="en-US"/>
           </a:p>
@@ -5145,7 +5145,7 @@
           <a:p>
             <a:fld id="{473554FD-CB64-474C-AA34-D39D6235D9DC}" type="datetimeFigureOut">
               <a:rPr lang="en-US" smtClean="0"/>
-              <a:t>5/8/2023</a:t>
+              <a:t>10/18/2023</a:t>
             </a:fld>
             <a:endParaRPr lang="en-US"/>
           </a:p>
@@ -5422,7 +5422,7 @@
           <a:p>
             <a:fld id="{473554FD-CB64-474C-AA34-D39D6235D9DC}" type="datetimeFigureOut">
               <a:rPr lang="en-US" smtClean="0"/>
-              <a:t>5/8/2023</a:t>
+              <a:t>10/18/2023</a:t>
             </a:fld>
             <a:endParaRPr lang="en-US"/>
           </a:p>
@@ -5679,7 +5679,7 @@
           <a:p>
             <a:fld id="{473554FD-CB64-474C-AA34-D39D6235D9DC}" type="datetimeFigureOut">
               <a:rPr lang="en-US" smtClean="0"/>
-              <a:t>5/8/2023</a:t>
+              <a:t>10/18/2023</a:t>
             </a:fld>
             <a:endParaRPr lang="en-US"/>
           </a:p>
@@ -5892,7 +5892,7 @@
           <a:p>
             <a:fld id="{473554FD-CB64-474C-AA34-D39D6235D9DC}" type="datetimeFigureOut">
               <a:rPr lang="en-US" smtClean="0"/>
-              <a:t>5/8/2023</a:t>
+              <a:t>10/18/2023</a:t>
             </a:fld>
             <a:endParaRPr lang="en-US"/>
           </a:p>
@@ -6873,8 +6873,8 @@
         </p:nvSpPr>
         <p:spPr>
           <a:xfrm>
-            <a:off x="3138729" y="2733809"/>
-            <a:ext cx="3538594" cy="369332"/>
+            <a:off x="3278654" y="2782979"/>
+            <a:ext cx="3207150" cy="338554"/>
           </a:xfrm>
           <a:prstGeom prst="rect">
             <a:avLst/>
@@ -6888,11 +6888,11 @@
           <a:lstStyle/>
           <a:p>
             <a:r>
-              <a:rPr lang="en-US" dirty="0">
+              <a:rPr lang="en-US" sz="1600" dirty="0">
                 <a:latin typeface="Arial" panose="020B0604020202020204" pitchFamily="34" charset="0"/>
                 <a:cs typeface="Arial" panose="020B0604020202020204" pitchFamily="34" charset="0"/>
               </a:rPr>
-              <a:t>One RF Recording Consists of</a:t>
+              <a:t>An RF recording is a pair of files:</a:t>
             </a:r>
           </a:p>
         </p:txBody>
@@ -6926,8 +6926,8 @@
         </p:blipFill>
         <p:spPr bwMode="auto">
           <a:xfrm>
-            <a:off x="4089545" y="1040810"/>
-            <a:ext cx="1547419" cy="1664451"/>
+            <a:off x="3966927" y="912174"/>
+            <a:ext cx="1746003" cy="1878054"/>
           </a:xfrm>
           <a:prstGeom prst="rect">
             <a:avLst/>
@@ -7625,8 +7625,8 @@
         </p:nvSpPr>
         <p:spPr>
           <a:xfrm>
-            <a:off x="863256" y="2857170"/>
-            <a:ext cx="2875809" cy="461665"/>
+            <a:off x="863257" y="2822000"/>
+            <a:ext cx="2182378" cy="461665"/>
           </a:xfrm>
           <a:prstGeom prst="rect">
             <a:avLst/>
@@ -8230,7 +8230,7 @@
         </p:nvSpPr>
         <p:spPr>
           <a:xfrm>
-            <a:off x="4223707" y="4860839"/>
+            <a:off x="4223707" y="4804567"/>
             <a:ext cx="2211611" cy="461665"/>
           </a:xfrm>
           <a:prstGeom prst="rect">
@@ -8268,8 +8268,8 @@
         </p:nvSpPr>
         <p:spPr>
           <a:xfrm>
-            <a:off x="2527203" y="7168876"/>
-            <a:ext cx="3978372" cy="879041"/>
+            <a:off x="2527203" y="7049588"/>
+            <a:ext cx="3978372" cy="998329"/>
           </a:xfrm>
           <a:prstGeom prst="rect">
             <a:avLst/>
@@ -8320,7 +8320,7 @@
         </p:nvSpPr>
         <p:spPr>
           <a:xfrm>
-            <a:off x="3240868" y="7172625"/>
+            <a:off x="3128324" y="7031945"/>
             <a:ext cx="2875809" cy="461665"/>
           </a:xfrm>
           <a:prstGeom prst="rect">
@@ -8362,8 +8362,8 @@
         </p:nvSpPr>
         <p:spPr>
           <a:xfrm>
-            <a:off x="3032445" y="7609581"/>
-            <a:ext cx="3597456" cy="369332"/>
+            <a:off x="3661431" y="7688624"/>
+            <a:ext cx="1057100" cy="338554"/>
           </a:xfrm>
           <a:prstGeom prst="rect">
             <a:avLst/>
@@ -8378,14 +8378,17 @@
           <a:p>
             <a:pPr algn="ctr"/>
             <a:r>
-              <a:rPr lang="en-US" i="1" dirty="0">
+              <a:rPr lang="en-US" sz="1600" i="1" dirty="0">
                 <a:solidFill>
-                  <a:schemeClr val="bg1"/>
+                  <a:schemeClr val="accent1">
+                    <a:lumMod val="20000"/>
+                    <a:lumOff val="80000"/>
+                  </a:schemeClr>
                 </a:solidFill>
                 <a:latin typeface="Arial" panose="020B0604020202020204" pitchFamily="34" charset="0"/>
                 <a:cs typeface="Arial" panose="020B0604020202020204" pitchFamily="34" charset="0"/>
               </a:rPr>
-              <a:t>signal    spatial    antenna</a:t>
+              <a:t>antenna</a:t>
             </a:r>
           </a:p>
         </p:txBody>
@@ -8404,8 +8407,8 @@
         </p:nvSpPr>
         <p:spPr>
           <a:xfrm rot="5400000">
-            <a:off x="5895564" y="7129190"/>
-            <a:ext cx="385011" cy="413886"/>
+            <a:off x="5848545" y="6976662"/>
+            <a:ext cx="479049" cy="413886"/>
           </a:xfrm>
           <a:prstGeom prst="rightArrow">
             <a:avLst/>
@@ -8533,7 +8536,7 @@
         </p:nvGrpSpPr>
         <p:grpSpPr>
           <a:xfrm>
-            <a:off x="119318" y="6088537"/>
+            <a:off x="119318" y="6032265"/>
             <a:ext cx="1308142" cy="876375"/>
             <a:chOff x="1586360" y="6231877"/>
             <a:chExt cx="2213922" cy="876375"/>
@@ -8655,8 +8658,8 @@
         </p:nvSpPr>
         <p:spPr>
           <a:xfrm>
-            <a:off x="4414542" y="5384645"/>
-            <a:ext cx="2158472" cy="1735283"/>
+            <a:off x="4370831" y="5209303"/>
+            <a:ext cx="2435015" cy="1831463"/>
           </a:xfrm>
           <a:prstGeom prst="rect">
             <a:avLst/>
@@ -8671,12 +8674,31 @@
           <a:p>
             <a:pPr>
               <a:lnSpc>
-                <a:spcPts val="800"/>
+                <a:spcPts val="1000"/>
               </a:lnSpc>
             </a:pPr>
             <a:r>
               <a:rPr lang="en-US" sz="800" dirty="0"/>
               <a:t>{</a:t>
+            </a:r>
+          </a:p>
+          <a:p>
+            <a:pPr>
+              <a:lnSpc>
+                <a:spcPts val="1000"/>
+              </a:lnSpc>
+            </a:pPr>
+            <a:r>
+              <a:rPr lang="en-US" sz="800" dirty="0"/>
+              <a:t>    "</a:t>
+            </a:r>
+            <a:r>
+              <a:rPr lang="en-US" sz="800" b="1" dirty="0"/>
+              <a:t>global</a:t>
+            </a:r>
+            <a:r>
+              <a:rPr lang="en-US" sz="800" dirty="0"/>
+              <a:t>": {</a:t>
             </a:r>
           </a:p>
           <a:p>
@@ -8687,15 +8709,7 @@
             </a:pPr>
             <a:r>
               <a:rPr lang="en-US" sz="800" dirty="0"/>
-              <a:t>    "</a:t>
-            </a:r>
-            <a:r>
-              <a:rPr lang="en-US" sz="800" b="1" dirty="0"/>
-              <a:t>global</a:t>
-            </a:r>
-            <a:r>
-              <a:rPr lang="en-US" sz="800" dirty="0"/>
-              <a:t>": {</a:t>
+              <a:t>        "core:datatype": "cf32_le",</a:t>
             </a:r>
           </a:p>
           <a:p>
@@ -8706,7 +8720,7 @@
             </a:pPr>
             <a:r>
               <a:rPr lang="en-US" sz="800" dirty="0"/>
-              <a:t>        "core:datatype": "cf32_le",</a:t>
+              <a:t>        "core:sample_rate": 1000000,</a:t>
             </a:r>
           </a:p>
           <a:p>
@@ -8717,7 +8731,7 @@
             </a:pPr>
             <a:r>
               <a:rPr lang="en-US" sz="800" dirty="0"/>
-              <a:t>        "core:sample_rate": 1000000,</a:t>
+              <a:t>        "core:hw": "PlutoSDR with 915 MHz whip",</a:t>
             </a:r>
           </a:p>
           <a:p>
@@ -8728,7 +8742,7 @@
             </a:pPr>
             <a:r>
               <a:rPr lang="en-US" sz="800" dirty="0"/>
-              <a:t>        "core:hw": "PlutoSDR with 915 MHz whip",</a:t>
+              <a:t>        "core:author": "Art Vandelay",</a:t>
             </a:r>
           </a:p>
           <a:p>
@@ -8739,7 +8753,7 @@
             </a:pPr>
             <a:r>
               <a:rPr lang="en-US" sz="800" dirty="0"/>
-              <a:t>        "core:author": "Art Vandelay",</a:t>
+              <a:t>        "core:version": "1.0.0"</a:t>
             </a:r>
           </a:p>
           <a:p>
@@ -8750,7 +8764,7 @@
             </a:pPr>
             <a:r>
               <a:rPr lang="en-US" sz="800" dirty="0"/>
-              <a:t>        "core:version": "1.0.0"</a:t>
+              <a:t>    },</a:t>
             </a:r>
           </a:p>
           <a:p>
@@ -8761,7 +8775,15 @@
             </a:pPr>
             <a:r>
               <a:rPr lang="en-US" sz="800" dirty="0"/>
-              <a:t>    },</a:t>
+              <a:t>    "</a:t>
+            </a:r>
+            <a:r>
+              <a:rPr lang="en-US" sz="800" b="1" dirty="0"/>
+              <a:t>captures</a:t>
+            </a:r>
+            <a:r>
+              <a:rPr lang="en-US" sz="800" dirty="0"/>
+              <a:t>": [</a:t>
             </a:r>
           </a:p>
           <a:p>
@@ -8772,15 +8794,7 @@
             </a:pPr>
             <a:r>
               <a:rPr lang="en-US" sz="800" dirty="0"/>
-              <a:t>    "</a:t>
-            </a:r>
-            <a:r>
-              <a:rPr lang="en-US" sz="800" b="1" dirty="0"/>
-              <a:t>captures</a:t>
-            </a:r>
-            <a:r>
-              <a:rPr lang="en-US" sz="800" dirty="0"/>
-              <a:t>": [</a:t>
+              <a:t>        {</a:t>
             </a:r>
           </a:p>
           <a:p>
@@ -8791,7 +8805,7 @@
             </a:pPr>
             <a:r>
               <a:rPr lang="en-US" sz="800" dirty="0"/>
-              <a:t>        {</a:t>
+              <a:t>            "core:sample_start": 0,</a:t>
             </a:r>
           </a:p>
           <a:p>
@@ -8802,7 +8816,7 @@
             </a:pPr>
             <a:r>
               <a:rPr lang="en-US" sz="800" dirty="0"/>
-              <a:t>            "core:sample_start": 0,</a:t>
+              <a:t>            "core:frequency": 915000000</a:t>
             </a:r>
           </a:p>
           <a:p>
@@ -8813,7 +8827,7 @@
             </a:pPr>
             <a:r>
               <a:rPr lang="en-US" sz="800" dirty="0"/>
-              <a:t>            "core:frequency": 915000000</a:t>
+              <a:t>        }</a:t>
             </a:r>
           </a:p>
           <a:p>
@@ -8824,43 +8838,32 @@
             </a:pPr>
             <a:r>
               <a:rPr lang="en-US" sz="800" dirty="0"/>
-              <a:t>        }</a:t>
+              <a:t>    ],</a:t>
             </a:r>
           </a:p>
           <a:p>
             <a:pPr>
               <a:lnSpc>
-                <a:spcPts val="800"/>
+                <a:spcPts val="1000"/>
               </a:lnSpc>
             </a:pPr>
             <a:r>
               <a:rPr lang="en-US" sz="800" dirty="0"/>
-              <a:t>    ],</a:t>
+              <a:t>    "</a:t>
+            </a:r>
+            <a:r>
+              <a:rPr lang="en-US" sz="800" b="1" dirty="0"/>
+              <a:t>annotations</a:t>
+            </a:r>
+            <a:r>
+              <a:rPr lang="en-US" sz="800" dirty="0"/>
+              <a:t>": []</a:t>
             </a:r>
           </a:p>
           <a:p>
             <a:pPr>
               <a:lnSpc>
-                <a:spcPts val="800"/>
-              </a:lnSpc>
-            </a:pPr>
-            <a:r>
-              <a:rPr lang="en-US" sz="800" dirty="0"/>
-              <a:t>    "</a:t>
-            </a:r>
-            <a:r>
-              <a:rPr lang="en-US" sz="800" b="1" dirty="0"/>
-              <a:t>annotations</a:t>
-            </a:r>
-            <a:r>
-              <a:rPr lang="en-US" sz="800" dirty="0"/>
-              <a:t>": []</a:t>
-            </a:r>
-          </a:p>
-          <a:p>
-            <a:pPr>
-              <a:lnSpc>
-                <a:spcPts val="800"/>
+                <a:spcPts val="1000"/>
               </a:lnSpc>
             </a:pPr>
             <a:r>
@@ -8884,7 +8887,7 @@
         </p:nvGrpSpPr>
         <p:grpSpPr>
           <a:xfrm>
-            <a:off x="1562093" y="6088537"/>
+            <a:off x="1562093" y="6032265"/>
             <a:ext cx="1308142" cy="876375"/>
             <a:chOff x="1586360" y="6231877"/>
             <a:chExt cx="2213922" cy="876375"/>
@@ -9006,7 +9009,7 @@
         </p:nvGrpSpPr>
         <p:grpSpPr>
           <a:xfrm>
-            <a:off x="3004867" y="6088537"/>
+            <a:off x="3004867" y="6032265"/>
             <a:ext cx="1308142" cy="876375"/>
             <a:chOff x="1586360" y="6231877"/>
             <a:chExt cx="2213922" cy="876375"/>
@@ -9145,7 +9148,7 @@
         </p:blipFill>
         <p:spPr>
           <a:xfrm>
-            <a:off x="258532" y="6450725"/>
+            <a:off x="258532" y="6394453"/>
             <a:ext cx="243516" cy="243516"/>
           </a:xfrm>
           <a:prstGeom prst="rect">
@@ -9184,7 +9187,7 @@
         </p:blipFill>
         <p:spPr>
           <a:xfrm>
-            <a:off x="460793" y="6588953"/>
+            <a:off x="460793" y="6532681"/>
             <a:ext cx="300691" cy="300691"/>
           </a:xfrm>
           <a:prstGeom prst="rect">
@@ -9223,7 +9226,7 @@
         </p:blipFill>
         <p:spPr>
           <a:xfrm>
-            <a:off x="747478" y="6409757"/>
+            <a:off x="747478" y="6353485"/>
             <a:ext cx="279975" cy="279975"/>
           </a:xfrm>
           <a:prstGeom prst="rect">
@@ -9262,7 +9265,7 @@
         </p:blipFill>
         <p:spPr>
           <a:xfrm>
-            <a:off x="1027453" y="6611814"/>
+            <a:off x="1027453" y="6555542"/>
             <a:ext cx="295907" cy="295907"/>
           </a:xfrm>
           <a:prstGeom prst="rect">
@@ -9286,7 +9289,7 @@
         </p:nvCxnSpPr>
         <p:spPr>
           <a:xfrm>
-            <a:off x="1902266" y="6786807"/>
+            <a:off x="1902266" y="6730535"/>
             <a:ext cx="788193" cy="0"/>
           </a:xfrm>
           <a:prstGeom prst="straightConnector1">
@@ -9330,7 +9333,7 @@
         </p:nvCxnSpPr>
         <p:spPr>
           <a:xfrm flipV="1">
-            <a:off x="1916554" y="6391520"/>
+            <a:off x="1916554" y="6335248"/>
             <a:ext cx="0" cy="404487"/>
           </a:xfrm>
           <a:prstGeom prst="straightConnector1">
@@ -9372,7 +9375,7 @@
         </p:nvSpPr>
         <p:spPr>
           <a:xfrm>
-            <a:off x="2003335" y="6753903"/>
+            <a:off x="2003335" y="6697631"/>
             <a:ext cx="437091" cy="230832"/>
           </a:xfrm>
           <a:prstGeom prst="rect">
@@ -9413,7 +9416,7 @@
         </p:nvSpPr>
         <p:spPr>
           <a:xfrm>
-            <a:off x="1585957" y="6503248"/>
+            <a:off x="1585957" y="6446976"/>
             <a:ext cx="437091" cy="230832"/>
           </a:xfrm>
           <a:prstGeom prst="rect">
@@ -9454,7 +9457,7 @@
         </p:nvSpPr>
         <p:spPr>
           <a:xfrm>
-            <a:off x="1948915" y="6521322"/>
+            <a:off x="1948915" y="6465050"/>
             <a:ext cx="252174" cy="72706"/>
           </a:xfrm>
           <a:prstGeom prst="rect">
@@ -9506,7 +9509,7 @@
         </p:nvSpPr>
         <p:spPr>
           <a:xfrm>
-            <a:off x="2205850" y="6680626"/>
+            <a:off x="2205850" y="6624354"/>
             <a:ext cx="159505" cy="72706"/>
           </a:xfrm>
           <a:prstGeom prst="rect">
@@ -9558,7 +9561,7 @@
         </p:nvSpPr>
         <p:spPr>
           <a:xfrm>
-            <a:off x="2367736" y="6595575"/>
+            <a:off x="2367736" y="6539303"/>
             <a:ext cx="266790" cy="72706"/>
           </a:xfrm>
           <a:prstGeom prst="rect">
@@ -9627,7 +9630,7 @@
         </p:blipFill>
         <p:spPr>
           <a:xfrm>
-            <a:off x="3936705" y="6648989"/>
+            <a:off x="3936705" y="6592717"/>
             <a:ext cx="422815" cy="422815"/>
           </a:xfrm>
           <a:prstGeom prst="rect">
@@ -9649,7 +9652,7 @@
         </p:nvSpPr>
         <p:spPr>
           <a:xfrm>
-            <a:off x="3140370" y="6349117"/>
+            <a:off x="3140370" y="6292845"/>
             <a:ext cx="1161001" cy="630942"/>
           </a:xfrm>
           <a:prstGeom prst="rect">
@@ -9728,7 +9731,7 @@
         </p:nvSpPr>
         <p:spPr>
           <a:xfrm>
-            <a:off x="669796" y="5866596"/>
+            <a:off x="669796" y="5810324"/>
             <a:ext cx="207186" cy="207186"/>
           </a:xfrm>
           <a:prstGeom prst="ellipse">
@@ -9786,7 +9789,7 @@
         </p:nvSpPr>
         <p:spPr>
           <a:xfrm>
-            <a:off x="2112571" y="5866596"/>
+            <a:off x="2112571" y="5810324"/>
             <a:ext cx="207186" cy="207186"/>
           </a:xfrm>
           <a:prstGeom prst="ellipse">
@@ -9844,7 +9847,7 @@
         </p:nvSpPr>
         <p:spPr>
           <a:xfrm>
-            <a:off x="3555345" y="5866596"/>
+            <a:off x="3555345" y="5810324"/>
             <a:ext cx="207186" cy="207186"/>
           </a:xfrm>
           <a:prstGeom prst="ellipse">
@@ -9941,8 +9944,8 @@
         </p:nvSpPr>
         <p:spPr>
           <a:xfrm>
-            <a:off x="-3260" y="7168876"/>
-            <a:ext cx="2546554" cy="879041"/>
+            <a:off x="-3260" y="7053958"/>
+            <a:ext cx="2546554" cy="993960"/>
           </a:xfrm>
           <a:prstGeom prst="rect">
             <a:avLst/>
@@ -10100,8 +10103,8 @@
         </p:blipFill>
         <p:spPr>
           <a:xfrm>
-            <a:off x="1016853" y="7252030"/>
-            <a:ext cx="506326" cy="515449"/>
+            <a:off x="968343" y="7110240"/>
+            <a:ext cx="646197" cy="657840"/>
           </a:xfrm>
           <a:prstGeom prst="rect">
             <a:avLst/>
@@ -10147,6 +10150,214 @@
           </a:prstGeom>
         </p:spPr>
       </p:pic>
+      <p:sp>
+        <p:nvSpPr>
+          <p:cNvPr id="3" name="TextBox 2">
+            <a:extLst>
+              <a:ext uri="{FF2B5EF4-FFF2-40B4-BE49-F238E27FC236}">
+                <a16:creationId xmlns:a16="http://schemas.microsoft.com/office/drawing/2014/main" id="{227BA1E7-B1B3-AED3-3315-FC10B0BDCEAB}"/>
+              </a:ext>
+            </a:extLst>
+          </p:cNvPr>
+          <p:cNvSpPr txBox="1"/>
+          <p:nvPr/>
+        </p:nvSpPr>
+        <p:spPr>
+          <a:xfrm>
+            <a:off x="4365835" y="7420250"/>
+            <a:ext cx="914400" cy="338554"/>
+          </a:xfrm>
+          <a:prstGeom prst="rect">
+            <a:avLst/>
+          </a:prstGeom>
+          <a:noFill/>
+        </p:spPr>
+        <p:txBody>
+          <a:bodyPr wrap="square">
+            <a:spAutoFit/>
+          </a:bodyPr>
+          <a:lstStyle/>
+          <a:p>
+            <a:r>
+              <a:rPr lang="en-US" sz="1600" i="1" dirty="0">
+                <a:solidFill>
+                  <a:schemeClr val="accent1">
+                    <a:lumMod val="20000"/>
+                    <a:lumOff val="80000"/>
+                  </a:schemeClr>
+                </a:solidFill>
+                <a:latin typeface="Arial" panose="020B0604020202020204" pitchFamily="34" charset="0"/>
+                <a:cs typeface="Arial" panose="020B0604020202020204" pitchFamily="34" charset="0"/>
+              </a:rPr>
+              <a:t>spatial</a:t>
+            </a:r>
+            <a:endParaRPr lang="en-US" sz="1600" dirty="0">
+              <a:solidFill>
+                <a:schemeClr val="accent1">
+                  <a:lumMod val="20000"/>
+                  <a:lumOff val="80000"/>
+                </a:schemeClr>
+              </a:solidFill>
+            </a:endParaRPr>
+          </a:p>
+        </p:txBody>
+      </p:sp>
+      <p:sp>
+        <p:nvSpPr>
+          <p:cNvPr id="5" name="TextBox 4">
+            <a:extLst>
+              <a:ext uri="{FF2B5EF4-FFF2-40B4-BE49-F238E27FC236}">
+                <a16:creationId xmlns:a16="http://schemas.microsoft.com/office/drawing/2014/main" id="{94554A4D-C6BC-3330-41F8-3DAD31882C81}"/>
+              </a:ext>
+            </a:extLst>
+          </p:cNvPr>
+          <p:cNvSpPr txBox="1"/>
+          <p:nvPr/>
+        </p:nvSpPr>
+        <p:spPr>
+          <a:xfrm>
+            <a:off x="3316561" y="7432903"/>
+            <a:ext cx="823862" cy="338554"/>
+          </a:xfrm>
+          <a:prstGeom prst="rect">
+            <a:avLst/>
+          </a:prstGeom>
+          <a:noFill/>
+        </p:spPr>
+        <p:txBody>
+          <a:bodyPr wrap="square">
+            <a:spAutoFit/>
+          </a:bodyPr>
+          <a:lstStyle/>
+          <a:p>
+            <a:r>
+              <a:rPr lang="en-US" sz="1600" i="1" dirty="0">
+                <a:solidFill>
+                  <a:schemeClr val="accent1">
+                    <a:lumMod val="20000"/>
+                    <a:lumOff val="80000"/>
+                  </a:schemeClr>
+                </a:solidFill>
+                <a:latin typeface="Arial" panose="020B0604020202020204" pitchFamily="34" charset="0"/>
+                <a:cs typeface="Arial" panose="020B0604020202020204" pitchFamily="34" charset="0"/>
+              </a:rPr>
+              <a:t>signal</a:t>
+            </a:r>
+            <a:endParaRPr lang="en-US" sz="1600" dirty="0">
+              <a:solidFill>
+                <a:schemeClr val="accent1">
+                  <a:lumMod val="20000"/>
+                  <a:lumOff val="80000"/>
+                </a:schemeClr>
+              </a:solidFill>
+            </a:endParaRPr>
+          </a:p>
+        </p:txBody>
+      </p:sp>
+      <p:sp>
+        <p:nvSpPr>
+          <p:cNvPr id="6" name="TextBox 5">
+            <a:extLst>
+              <a:ext uri="{FF2B5EF4-FFF2-40B4-BE49-F238E27FC236}">
+                <a16:creationId xmlns:a16="http://schemas.microsoft.com/office/drawing/2014/main" id="{7D412D83-6973-8757-0EEB-3362FF03AA9E}"/>
+              </a:ext>
+            </a:extLst>
+          </p:cNvPr>
+          <p:cNvSpPr txBox="1"/>
+          <p:nvPr/>
+        </p:nvSpPr>
+        <p:spPr>
+          <a:xfrm>
+            <a:off x="5412355" y="7377158"/>
+            <a:ext cx="585189" cy="338554"/>
+          </a:xfrm>
+          <a:prstGeom prst="rect">
+            <a:avLst/>
+          </a:prstGeom>
+          <a:noFill/>
+        </p:spPr>
+        <p:txBody>
+          <a:bodyPr wrap="square">
+            <a:spAutoFit/>
+          </a:bodyPr>
+          <a:lstStyle/>
+          <a:p>
+            <a:r>
+              <a:rPr lang="en-US" sz="1600" i="1" dirty="0">
+                <a:solidFill>
+                  <a:schemeClr val="accent1">
+                    <a:lumMod val="20000"/>
+                    <a:lumOff val="80000"/>
+                  </a:schemeClr>
+                </a:solidFill>
+                <a:latin typeface="Arial" panose="020B0604020202020204" pitchFamily="34" charset="0"/>
+                <a:cs typeface="Arial" panose="020B0604020202020204" pitchFamily="34" charset="0"/>
+              </a:rPr>
+              <a:t>wifi</a:t>
+            </a:r>
+            <a:endParaRPr lang="en-US" sz="1600" dirty="0">
+              <a:solidFill>
+                <a:schemeClr val="accent1">
+                  <a:lumMod val="20000"/>
+                  <a:lumOff val="80000"/>
+                </a:schemeClr>
+              </a:solidFill>
+            </a:endParaRPr>
+          </a:p>
+        </p:txBody>
+      </p:sp>
+      <p:sp>
+        <p:nvSpPr>
+          <p:cNvPr id="7" name="TextBox 6">
+            <a:extLst>
+              <a:ext uri="{FF2B5EF4-FFF2-40B4-BE49-F238E27FC236}">
+                <a16:creationId xmlns:a16="http://schemas.microsoft.com/office/drawing/2014/main" id="{E1992F3A-3D63-1821-6A39-E5695B30FD1F}"/>
+              </a:ext>
+            </a:extLst>
+          </p:cNvPr>
+          <p:cNvSpPr txBox="1"/>
+          <p:nvPr/>
+        </p:nvSpPr>
+        <p:spPr>
+          <a:xfrm>
+            <a:off x="4938358" y="7692030"/>
+            <a:ext cx="1191307" cy="338554"/>
+          </a:xfrm>
+          <a:prstGeom prst="rect">
+            <a:avLst/>
+          </a:prstGeom>
+          <a:noFill/>
+        </p:spPr>
+        <p:txBody>
+          <a:bodyPr wrap="square">
+            <a:spAutoFit/>
+          </a:bodyPr>
+          <a:lstStyle/>
+          <a:p>
+            <a:r>
+              <a:rPr lang="en-US" sz="1600" i="1" dirty="0">
+                <a:solidFill>
+                  <a:schemeClr val="accent1">
+                    <a:lumMod val="20000"/>
+                    <a:lumOff val="80000"/>
+                  </a:schemeClr>
+                </a:solidFill>
+                <a:latin typeface="Arial" panose="020B0604020202020204" pitchFamily="34" charset="0"/>
+                <a:cs typeface="Arial" panose="020B0604020202020204" pitchFamily="34" charset="0"/>
+              </a:rPr>
+              <a:t>traceability</a:t>
+            </a:r>
+            <a:endParaRPr lang="en-US" sz="1600" dirty="0">
+              <a:solidFill>
+                <a:schemeClr val="accent1">
+                  <a:lumMod val="20000"/>
+                  <a:lumOff val="80000"/>
+                </a:schemeClr>
+              </a:solidFill>
+            </a:endParaRPr>
+          </a:p>
+        </p:txBody>
+      </p:sp>
     </p:spTree>
     <p:extLst>
       <p:ext uri="{BB962C8B-B14F-4D97-AF65-F5344CB8AC3E}">

</xml_diff>